<commit_message>
updated ppt presentation. Made changes to table and removed code that was creating errors
</commit_message>
<xml_diff>
--- a/Presentation.pptx
+++ b/Presentation.pptx
@@ -601,7 +601,7 @@
           <a:p>
             <a:fld id="{EA0C0817-A112-4847-8014-A94B7D2A4EA3}" type="datetime1">
               <a:rPr lang="en-US" smtClean="0"/>
-              <a:t>8/14/2021</a:t>
+              <a:t>8/15/2021</a:t>
             </a:fld>
             <a:endParaRPr lang="en-US" dirty="0"/>
           </a:p>
@@ -803,7 +803,7 @@
           <a:p>
             <a:fld id="{7332B432-ACDA-4023-A761-2BAB76577B62}" type="datetime1">
               <a:rPr lang="en-US" smtClean="0"/>
-              <a:t>8/14/2021</a:t>
+              <a:t>8/15/2021</a:t>
             </a:fld>
             <a:endParaRPr lang="en-US" dirty="0"/>
           </a:p>
@@ -1402,7 +1402,7 @@
           <a:p>
             <a:fld id="{D9C646AA-F36E-4540-911D-FFFC0A0EF24A}" type="datetime1">
               <a:rPr lang="en-US" smtClean="0"/>
-              <a:t>8/14/2021</a:t>
+              <a:t>8/15/2021</a:t>
             </a:fld>
             <a:endParaRPr lang="en-US" dirty="0"/>
           </a:p>
@@ -1722,7 +1722,7 @@
           <a:p>
             <a:fld id="{69186D26-FA5F-4637-B602-B7C2DC34CFD4}" type="datetime1">
               <a:rPr lang="en-US" smtClean="0"/>
-              <a:t>8/14/2021</a:t>
+              <a:t>8/15/2021</a:t>
             </a:fld>
             <a:endParaRPr lang="en-US" dirty="0"/>
           </a:p>
@@ -2159,7 +2159,7 @@
           <a:p>
             <a:fld id="{8A7F15D8-96D1-4781-BC50-CA8A088B2FE4}" type="datetime1">
               <a:rPr lang="en-US" smtClean="0"/>
-              <a:t>8/14/2021</a:t>
+              <a:t>8/15/2021</a:t>
             </a:fld>
             <a:endParaRPr lang="en-US" dirty="0"/>
           </a:p>
@@ -2277,7 +2277,7 @@
           <a:p>
             <a:fld id="{F9A96C99-B8F8-4528-BD05-0E16E943DC09}" type="datetime1">
               <a:rPr lang="en-US" smtClean="0"/>
-              <a:t>8/14/2021</a:t>
+              <a:t>8/15/2021</a:t>
             </a:fld>
             <a:endParaRPr lang="en-US" dirty="0"/>
           </a:p>
@@ -2372,7 +2372,7 @@
           <a:p>
             <a:fld id="{03636942-C211-4B28-8DBD-C953E00AF71B}" type="datetime1">
               <a:rPr lang="en-US" smtClean="0"/>
-              <a:t>8/14/2021</a:t>
+              <a:t>8/15/2021</a:t>
             </a:fld>
             <a:endParaRPr lang="en-US" dirty="0"/>
           </a:p>
@@ -2789,7 +2789,7 @@
           <a:p>
             <a:fld id="{7E8D12A6-918A-48BD-8CB9-CA713993B0EA}" type="datetime1">
               <a:rPr lang="en-US" smtClean="0"/>
-              <a:t>8/14/2021</a:t>
+              <a:t>8/15/2021</a:t>
             </a:fld>
             <a:endParaRPr lang="en-US" dirty="0"/>
           </a:p>
@@ -3051,7 +3051,7 @@
             <a:fld id="{E778CE86-875F-4587-BCF6-FA054AFC0D53}" type="datetime1">
               <a:rPr lang="en-US" smtClean="0"/>
               <a:pPr/>
-              <a:t>8/14/2021</a:t>
+              <a:t>8/15/2021</a:t>
             </a:fld>
             <a:endParaRPr lang="en-US" dirty="0"/>
           </a:p>
@@ -3567,7 +3567,7 @@
           <a:p>
             <a:fld id="{F6FA2B21-3FCD-4721-B95C-427943F61125}" type="datetime1">
               <a:rPr lang="en-US" smtClean="0"/>
-              <a:t>8/14/2021</a:t>
+              <a:t>8/15/2021</a:t>
             </a:fld>
             <a:endParaRPr lang="en-US" dirty="0"/>
           </a:p>
@@ -5329,10 +5329,10 @@
       </p:sp>
       <p:pic>
         <p:nvPicPr>
-          <p:cNvPr id="7" name="Picture 6">
+          <p:cNvPr id="12" name="Picture 11" descr="Chart, bar chart&#10;&#10;Description automatically generated">
             <a:extLst>
               <a:ext uri="{FF2B5EF4-FFF2-40B4-BE49-F238E27FC236}">
-                <a16:creationId xmlns:a16="http://schemas.microsoft.com/office/drawing/2014/main" id="{0B507946-4939-469C-8B15-E67A9571C26E}"/>
+                <a16:creationId xmlns:a16="http://schemas.microsoft.com/office/drawing/2014/main" id="{78CBC028-012B-46A5-B6E4-6062B3EAF5CA}"/>
               </a:ext>
             </a:extLst>
           </p:cNvPr>
@@ -5349,8 +5349,8 @@
         </p:blipFill>
         <p:spPr>
           <a:xfrm>
-            <a:off x="2751589" y="1462399"/>
-            <a:ext cx="6887361" cy="4678423"/>
+            <a:off x="2633135" y="1375280"/>
+            <a:ext cx="6795910" cy="4654732"/>
           </a:xfrm>
           <a:prstGeom prst="rect">
             <a:avLst/>
@@ -5403,7 +5403,12 @@
             <p:ph type="title"/>
           </p:nvPr>
         </p:nvSpPr>
-        <p:spPr/>
+        <p:spPr>
+          <a:xfrm>
+            <a:off x="897467" y="358140"/>
+            <a:ext cx="10058400" cy="1188720"/>
+          </a:xfrm>
+        </p:spPr>
         <p:txBody>
           <a:bodyPr>
             <a:normAutofit/>
@@ -5509,6 +5514,36 @@
           </a:p>
         </p:txBody>
       </p:sp>
+      <p:pic>
+        <p:nvPicPr>
+          <p:cNvPr id="7" name="Picture 6" descr="A screenshot of a computer&#10;&#10;Description automatically generated">
+            <a:extLst>
+              <a:ext uri="{FF2B5EF4-FFF2-40B4-BE49-F238E27FC236}">
+                <a16:creationId xmlns:a16="http://schemas.microsoft.com/office/drawing/2014/main" id="{013278D9-4E36-450E-B966-85930D234831}"/>
+              </a:ext>
+            </a:extLst>
+          </p:cNvPr>
+          <p:cNvPicPr>
+            <a:picLocks noChangeAspect="1"/>
+          </p:cNvPicPr>
+          <p:nvPr/>
+        </p:nvPicPr>
+        <p:blipFill>
+          <a:blip r:embed="rId2"/>
+          <a:stretch>
+            <a:fillRect/>
+          </a:stretch>
+        </p:blipFill>
+        <p:spPr>
+          <a:xfrm>
+            <a:off x="479278" y="1174326"/>
+            <a:ext cx="11233443" cy="4855686"/>
+          </a:xfrm>
+          <a:prstGeom prst="rect">
+            <a:avLst/>
+          </a:prstGeom>
+        </p:spPr>
+      </p:pic>
     </p:spTree>
     <p:extLst>
       <p:ext uri="{BB962C8B-B14F-4D97-AF65-F5344CB8AC3E}">
@@ -6702,24 +6737,6 @@
 </file>
 
 <file path=customXml/item1.xml><?xml version="1.0" encoding="utf-8"?>
-<p:properties xmlns:p="http://schemas.microsoft.com/office/2006/metadata/properties" xmlns:xsi="http://www.w3.org/2001/XMLSchema-instance" xmlns:pc="http://schemas.microsoft.com/office/infopath/2007/PartnerControls">
-  <documentManagement>
-    <Status xmlns="71af3243-3dd4-4a8d-8c0d-dd76da1f02a5">Not started</Status>
-    <MediaServiceKeyPoints xmlns="71af3243-3dd4-4a8d-8c0d-dd76da1f02a5" xsi:nil="true"/>
-  </documentManagement>
-</p:properties>
-</file>
-
-<file path=customXml/item2.xml><?xml version="1.0" encoding="utf-8"?>
-<?mso-contentType ?>
-<FormTemplates xmlns="http://schemas.microsoft.com/sharepoint/v3/contenttype/forms">
-  <Display>DocumentLibraryForm</Display>
-  <Edit>DocumentLibraryForm</Edit>
-  <New>DocumentLibraryForm</New>
-</FormTemplates>
-</file>
-
-<file path=customXml/item3.xml><?xml version="1.0" encoding="utf-8"?>
 <ct:contentTypeSchema xmlns:ct="http://schemas.microsoft.com/office/2006/metadata/contentType" xmlns:ma="http://schemas.microsoft.com/office/2006/metadata/properties/metaAttributes" ct:_="" ma:_="" ma:contentTypeName="Document" ma:contentTypeID="0x01010079F111ED35F8CC479449609E8A0923A6" ma:contentTypeVersion="12" ma:contentTypeDescription="Create a new document." ma:contentTypeScope="" ma:versionID="a410dd7f93c95333ffa1b60ed6adedd1">
   <xsd:schema xmlns:xsd="http://www.w3.org/2001/XMLSchema" xmlns:xs="http://www.w3.org/2001/XMLSchema" xmlns:p="http://schemas.microsoft.com/office/2006/metadata/properties" xmlns:ns2="71af3243-3dd4-4a8d-8c0d-dd76da1f02a5" xmlns:ns3="16c05727-aa75-4e4a-9b5f-8a80a1165891" targetNamespace="http://schemas.microsoft.com/office/2006/metadata/properties" ma:root="true" ma:fieldsID="a936d9baba76aa3866493feff160faab" ns2:_="" ns3:_="">
     <xsd:import namespace="71af3243-3dd4-4a8d-8c0d-dd76da1f02a5"/>
@@ -6940,25 +6957,25 @@
 </ct:contentTypeSchema>
 </file>
 
-<file path=customXml/itemProps1.xml><?xml version="1.0" encoding="utf-8"?>
-<ds:datastoreItem xmlns:ds="http://schemas.openxmlformats.org/officeDocument/2006/customXml" ds:itemID="{137651BA-F45C-4845-9AB3-E0A65B39F5E1}">
-  <ds:schemaRefs>
-    <ds:schemaRef ds:uri="http://schemas.microsoft.com/office/2006/metadata/properties"/>
-    <ds:schemaRef ds:uri="http://schemas.microsoft.com/office/infopath/2007/PartnerControls"/>
-    <ds:schemaRef ds:uri="71af3243-3dd4-4a8d-8c0d-dd76da1f02a5"/>
-  </ds:schemaRefs>
-</ds:datastoreItem>
+<file path=customXml/item2.xml><?xml version="1.0" encoding="utf-8"?>
+<?mso-contentType ?>
+<FormTemplates xmlns="http://schemas.microsoft.com/sharepoint/v3/contenttype/forms">
+  <Display>DocumentLibraryForm</Display>
+  <Edit>DocumentLibraryForm</Edit>
+  <New>DocumentLibraryForm</New>
+</FormTemplates>
 </file>
 
-<file path=customXml/itemProps2.xml><?xml version="1.0" encoding="utf-8"?>
-<ds:datastoreItem xmlns:ds="http://schemas.openxmlformats.org/officeDocument/2006/customXml" ds:itemID="{CDB58277-F8DF-46FF-84EC-EF41B835E69F}">
-  <ds:schemaRefs>
-    <ds:schemaRef ds:uri="http://schemas.microsoft.com/sharepoint/v3/contenttype/forms"/>
-  </ds:schemaRefs>
-</ds:datastoreItem>
+<file path=customXml/item3.xml><?xml version="1.0" encoding="utf-8"?>
+<p:properties xmlns:p="http://schemas.microsoft.com/office/2006/metadata/properties" xmlns:xsi="http://www.w3.org/2001/XMLSchema-instance" xmlns:pc="http://schemas.microsoft.com/office/infopath/2007/PartnerControls">
+  <documentManagement>
+    <Status xmlns="71af3243-3dd4-4a8d-8c0d-dd76da1f02a5">Not started</Status>
+    <MediaServiceKeyPoints xmlns="71af3243-3dd4-4a8d-8c0d-dd76da1f02a5" xsi:nil="true"/>
+  </documentManagement>
+</p:properties>
 </file>
 
-<file path=customXml/itemProps3.xml><?xml version="1.0" encoding="utf-8"?>
+<file path=customXml/itemProps1.xml><?xml version="1.0" encoding="utf-8"?>
 <ds:datastoreItem xmlns:ds="http://schemas.openxmlformats.org/officeDocument/2006/customXml" ds:itemID="{2D276E62-80A3-44DD-9BCC-97ED2B99B57F}">
   <ds:schemaRefs>
     <ds:schemaRef ds:uri="http://schemas.microsoft.com/office/2006/metadata/contentType"/>
@@ -6975,4 +6992,22 @@
     <ds:schemaRef ds:uri="http://schemas.microsoft.com/internal/obd"/>
   </ds:schemaRefs>
 </ds:datastoreItem>
+</file>
+
+<file path=customXml/itemProps2.xml><?xml version="1.0" encoding="utf-8"?>
+<ds:datastoreItem xmlns:ds="http://schemas.openxmlformats.org/officeDocument/2006/customXml" ds:itemID="{CDB58277-F8DF-46FF-84EC-EF41B835E69F}">
+  <ds:schemaRefs>
+    <ds:schemaRef ds:uri="http://schemas.microsoft.com/sharepoint/v3/contenttype/forms"/>
+  </ds:schemaRefs>
+</ds:datastoreItem>
+</file>
+
+<file path=customXml/itemProps3.xml><?xml version="1.0" encoding="utf-8"?>
+<ds:datastoreItem xmlns:ds="http://schemas.openxmlformats.org/officeDocument/2006/customXml" ds:itemID="{137651BA-F45C-4845-9AB3-E0A65B39F5E1}">
+  <ds:schemaRefs>
+    <ds:schemaRef ds:uri="http://schemas.microsoft.com/office/2006/metadata/properties"/>
+    <ds:schemaRef ds:uri="http://schemas.microsoft.com/office/infopath/2007/PartnerControls"/>
+    <ds:schemaRef ds:uri="71af3243-3dd4-4a8d-8c0d-dd76da1f02a5"/>
+  </ds:schemaRefs>
+</ds:datastoreItem>
 </file>
</xml_diff>

<commit_message>
finished adding the bubble map for 2020 weather events
</commit_message>
<xml_diff>
--- a/Presentation.pptx
+++ b/Presentation.pptx
@@ -11,9 +11,10 @@
     <p:sldId id="269" r:id="rId8"/>
     <p:sldId id="271" r:id="rId9"/>
     <p:sldId id="270" r:id="rId10"/>
-    <p:sldId id="273" r:id="rId11"/>
-    <p:sldId id="266" r:id="rId12"/>
-    <p:sldId id="274" r:id="rId13"/>
+    <p:sldId id="276" r:id="rId11"/>
+    <p:sldId id="273" r:id="rId12"/>
+    <p:sldId id="266" r:id="rId13"/>
+    <p:sldId id="274" r:id="rId14"/>
   </p:sldIdLst>
   <p:sldSz cx="12192000" cy="6858000"/>
   <p:notesSz cx="6858000" cy="9144000"/>
@@ -4421,6 +4422,202 @@
 </p:sld>
 </file>
 
+<file path=ppt/slides/slide10.xml><?xml version="1.0" encoding="utf-8"?>
+<p:sld xmlns:a="http://schemas.openxmlformats.org/drawingml/2006/main" xmlns:r="http://schemas.openxmlformats.org/officeDocument/2006/relationships" xmlns:p="http://schemas.openxmlformats.org/presentationml/2006/main">
+  <p:cSld>
+    <p:spTree>
+      <p:nvGrpSpPr>
+        <p:cNvPr id="1" name=""/>
+        <p:cNvGrpSpPr/>
+        <p:nvPr/>
+      </p:nvGrpSpPr>
+      <p:grpSpPr>
+        <a:xfrm>
+          <a:off x="0" y="0"/>
+          <a:ext cx="0" cy="0"/>
+          <a:chOff x="0" y="0"/>
+          <a:chExt cx="0" cy="0"/>
+        </a:xfrm>
+      </p:grpSpPr>
+      <p:sp>
+        <p:nvSpPr>
+          <p:cNvPr id="2" name="Title 1">
+            <a:extLst>
+              <a:ext uri="{FF2B5EF4-FFF2-40B4-BE49-F238E27FC236}">
+                <a16:creationId xmlns:a16="http://schemas.microsoft.com/office/drawing/2014/main" id="{AB091C5E-153A-4753-AF88-469D4DC67C7F}"/>
+              </a:ext>
+            </a:extLst>
+          </p:cNvPr>
+          <p:cNvSpPr>
+            <a:spLocks noGrp="1"/>
+          </p:cNvSpPr>
+          <p:nvPr>
+            <p:ph type="title"/>
+          </p:nvPr>
+        </p:nvSpPr>
+        <p:spPr/>
+        <p:txBody>
+          <a:bodyPr/>
+          <a:lstStyle/>
+          <a:p>
+            <a:pPr algn="ctr"/>
+            <a:r>
+              <a:rPr lang="en-US" dirty="0"/>
+              <a:t>Project Scope and Details</a:t>
+            </a:r>
+          </a:p>
+        </p:txBody>
+      </p:sp>
+      <p:sp>
+        <p:nvSpPr>
+          <p:cNvPr id="3" name="Content Placeholder 2">
+            <a:extLst>
+              <a:ext uri="{FF2B5EF4-FFF2-40B4-BE49-F238E27FC236}">
+                <a16:creationId xmlns:a16="http://schemas.microsoft.com/office/drawing/2014/main" id="{E28AF885-36A7-4E04-8763-219D2C1E0EDC}"/>
+              </a:ext>
+            </a:extLst>
+          </p:cNvPr>
+          <p:cNvSpPr>
+            <a:spLocks noGrp="1"/>
+          </p:cNvSpPr>
+          <p:nvPr>
+            <p:ph idx="1"/>
+          </p:nvPr>
+        </p:nvSpPr>
+        <p:spPr/>
+        <p:txBody>
+          <a:bodyPr/>
+          <a:lstStyle/>
+          <a:p>
+            <a:r>
+              <a:rPr lang="en-US" b="1" dirty="0">
+                <a:uFill>
+                  <a:noFill/>
+                </a:uFill>
+              </a:rPr>
+              <a:t>Project Focus: </a:t>
+            </a:r>
+            <a:r>
+              <a:rPr lang="en-US" dirty="0">
+                <a:uFill>
+                  <a:noFill/>
+                </a:uFill>
+              </a:rPr>
+              <a:t>top 10 most populated cities in the US - Austin, Chicago, Dallas, Houston, Los Angeles, New York, Philadelphia, Phoenix, San Antonio, San Diego </a:t>
+            </a:r>
+          </a:p>
+          <a:p>
+            <a:endParaRPr lang="en-US" dirty="0">
+              <a:uFill>
+                <a:noFill/>
+              </a:uFill>
+            </a:endParaRPr>
+          </a:p>
+          <a:p>
+            <a:r>
+              <a:rPr lang="en-US" b="1" dirty="0">
+                <a:uFill>
+                  <a:noFill/>
+                </a:uFill>
+              </a:rPr>
+              <a:t>Data cleaning:  </a:t>
+            </a:r>
+            <a:r>
+              <a:rPr lang="en-US" dirty="0">
+                <a:uFill>
+                  <a:noFill/>
+                </a:uFill>
+              </a:rPr>
+              <a:t>Original data file of 6.3M records was filtered to a manageable data record file of 54k:  Data filtering by major US city, and group summarizations by: Year, City, Weather Type, and Average percent per year calculations. </a:t>
+            </a:r>
+            <a:endParaRPr lang="en-US" sz="1100" dirty="0">
+              <a:solidFill>
+                <a:srgbClr val="000000"/>
+              </a:solidFill>
+              <a:latin typeface="Inter"/>
+            </a:endParaRPr>
+          </a:p>
+          <a:p>
+            <a:endParaRPr lang="en-US" b="1" dirty="0">
+              <a:uFill>
+                <a:noFill/>
+              </a:uFill>
+            </a:endParaRPr>
+          </a:p>
+          <a:p>
+            <a:r>
+              <a:rPr lang="en-US" b="1" dirty="0">
+                <a:uFill>
+                  <a:noFill/>
+                </a:uFill>
+              </a:rPr>
+              <a:t>Questions asked by the Team:  </a:t>
+            </a:r>
+            <a:r>
+              <a:rPr lang="en-US" dirty="0">
+                <a:uFill>
+                  <a:noFill/>
+                </a:uFill>
+              </a:rPr>
+              <a:t>Major US city climates impacted the least or greatest by rain, snow, cold, hail, fog, precipitation?  </a:t>
+            </a:r>
+            <a:endParaRPr lang="en-US" b="1" dirty="0">
+              <a:uFill>
+                <a:noFill/>
+              </a:uFill>
+            </a:endParaRPr>
+          </a:p>
+          <a:p>
+            <a:endParaRPr lang="en-US" b="1" dirty="0">
+              <a:uFill>
+                <a:noFill/>
+              </a:uFill>
+            </a:endParaRPr>
+          </a:p>
+          <a:p>
+            <a:r>
+              <a:rPr lang="en-US" b="1" dirty="0">
+                <a:uFill>
+                  <a:noFill/>
+                </a:uFill>
+              </a:rPr>
+              <a:t>The following were noted as deviations </a:t>
+            </a:r>
+            <a:r>
+              <a:rPr lang="en-US" b="1" u="sng" dirty="0">
+                <a:uFill>
+                  <a:noFill/>
+                </a:uFill>
+              </a:rPr>
+              <a:t>from what would normally be expected:  </a:t>
+            </a:r>
+          </a:p>
+          <a:p>
+            <a:endParaRPr lang="en-US" b="1" i="1" u="sng" dirty="0">
+              <a:uFill>
+                <a:noFill/>
+              </a:uFill>
+              <a:latin typeface="Calibri" panose="020F0502020204030204" pitchFamily="34" charset="0"/>
+            </a:endParaRPr>
+          </a:p>
+          <a:p>
+            <a:endParaRPr lang="en-US" dirty="0"/>
+          </a:p>
+        </p:txBody>
+      </p:sp>
+    </p:spTree>
+    <p:extLst>
+      <p:ext uri="{BB962C8B-B14F-4D97-AF65-F5344CB8AC3E}">
+        <p14:creationId xmlns:p14="http://schemas.microsoft.com/office/powerpoint/2010/main" val="4102569808"/>
+      </p:ext>
+    </p:extLst>
+  </p:cSld>
+  <p:clrMapOvr>
+    <a:masterClrMapping/>
+  </p:clrMapOvr>
+</p:sld>
+</file>
+
 <file path=ppt/slides/slide2.xml><?xml version="1.0" encoding="utf-8"?>
 <p:sld xmlns:a="http://schemas.openxmlformats.org/drawingml/2006/main" xmlns:r="http://schemas.openxmlformats.org/officeDocument/2006/relationships" xmlns:p="http://schemas.openxmlformats.org/presentationml/2006/main">
   <p:cSld>
@@ -5579,6 +5776,95 @@
           <p:cNvPr id="2" name="Title 1">
             <a:extLst>
               <a:ext uri="{FF2B5EF4-FFF2-40B4-BE49-F238E27FC236}">
+                <a16:creationId xmlns:a16="http://schemas.microsoft.com/office/drawing/2014/main" id="{BE3F49F9-EB2A-422D-84CF-BECE60BD7660}"/>
+              </a:ext>
+            </a:extLst>
+          </p:cNvPr>
+          <p:cNvSpPr>
+            <a:spLocks noGrp="1"/>
+          </p:cNvSpPr>
+          <p:nvPr>
+            <p:ph type="title"/>
+          </p:nvPr>
+        </p:nvSpPr>
+        <p:spPr/>
+        <p:txBody>
+          <a:bodyPr/>
+          <a:lstStyle/>
+          <a:p>
+            <a:pPr algn="ctr"/>
+            <a:r>
+              <a:rPr lang="en-US" dirty="0"/>
+              <a:t>Bubble Map</a:t>
+            </a:r>
+          </a:p>
+        </p:txBody>
+      </p:sp>
+      <p:pic>
+        <p:nvPicPr>
+          <p:cNvPr id="5" name="Picture 4" descr="A picture containing map&#10;&#10;Description automatically generated">
+            <a:extLst>
+              <a:ext uri="{FF2B5EF4-FFF2-40B4-BE49-F238E27FC236}">
+                <a16:creationId xmlns:a16="http://schemas.microsoft.com/office/drawing/2014/main" id="{91AFEBA3-6339-415A-A661-6B4B1D224A26}"/>
+              </a:ext>
+            </a:extLst>
+          </p:cNvPr>
+          <p:cNvPicPr>
+            <a:picLocks noChangeAspect="1"/>
+          </p:cNvPicPr>
+          <p:nvPr/>
+        </p:nvPicPr>
+        <p:blipFill>
+          <a:blip r:embed="rId2"/>
+          <a:stretch>
+            <a:fillRect/>
+          </a:stretch>
+        </p:blipFill>
+        <p:spPr>
+          <a:xfrm>
+            <a:off x="452437" y="2014194"/>
+            <a:ext cx="11287125" cy="4019550"/>
+          </a:xfrm>
+          <a:prstGeom prst="rect">
+            <a:avLst/>
+          </a:prstGeom>
+        </p:spPr>
+      </p:pic>
+    </p:spTree>
+    <p:extLst>
+      <p:ext uri="{BB962C8B-B14F-4D97-AF65-F5344CB8AC3E}">
+        <p14:creationId xmlns:p14="http://schemas.microsoft.com/office/powerpoint/2010/main" val="686961849"/>
+      </p:ext>
+    </p:extLst>
+  </p:cSld>
+  <p:clrMapOvr>
+    <a:masterClrMapping/>
+  </p:clrMapOvr>
+</p:sld>
+</file>
+
+<file path=ppt/slides/slide8.xml><?xml version="1.0" encoding="utf-8"?>
+<p:sld xmlns:a="http://schemas.openxmlformats.org/drawingml/2006/main" xmlns:r="http://schemas.openxmlformats.org/officeDocument/2006/relationships" xmlns:p="http://schemas.openxmlformats.org/presentationml/2006/main">
+  <p:cSld>
+    <p:spTree>
+      <p:nvGrpSpPr>
+        <p:cNvPr id="1" name=""/>
+        <p:cNvGrpSpPr/>
+        <p:nvPr/>
+      </p:nvGrpSpPr>
+      <p:grpSpPr>
+        <a:xfrm>
+          <a:off x="0" y="0"/>
+          <a:ext cx="0" cy="0"/>
+          <a:chOff x="0" y="0"/>
+          <a:chExt cx="0" cy="0"/>
+        </a:xfrm>
+      </p:grpSpPr>
+      <p:sp>
+        <p:nvSpPr>
+          <p:cNvPr id="2" name="Title 1">
+            <a:extLst>
+              <a:ext uri="{FF2B5EF4-FFF2-40B4-BE49-F238E27FC236}">
                 <a16:creationId xmlns:a16="http://schemas.microsoft.com/office/drawing/2014/main" id="{7A4919D0-F177-4BBA-9A0B-DBA69E2ED764}"/>
               </a:ext>
             </a:extLst>
@@ -5694,7 +5980,7 @@
           <a:p>
             <a:fld id="{34B7E4EF-A1BD-40F4-AB7B-04F084DD991D}" type="slidenum">
               <a:rPr lang="en-US" smtClean="0"/>
-              <a:t>7</a:t>
+              <a:t>8</a:t>
             </a:fld>
             <a:endParaRPr lang="en-US" dirty="0"/>
           </a:p>
@@ -5854,416 +6140,6 @@
 </p:sld>
 </file>
 
-<file path=ppt/slides/slide8.xml><?xml version="1.0" encoding="utf-8"?>
-<p:sld xmlns:a="http://schemas.openxmlformats.org/drawingml/2006/main" xmlns:r="http://schemas.openxmlformats.org/officeDocument/2006/relationships" xmlns:p="http://schemas.openxmlformats.org/presentationml/2006/main">
-  <p:cSld>
-    <p:spTree>
-      <p:nvGrpSpPr>
-        <p:cNvPr id="1" name=""/>
-        <p:cNvGrpSpPr/>
-        <p:nvPr/>
-      </p:nvGrpSpPr>
-      <p:grpSpPr>
-        <a:xfrm>
-          <a:off x="0" y="0"/>
-          <a:ext cx="0" cy="0"/>
-          <a:chOff x="0" y="0"/>
-          <a:chExt cx="0" cy="0"/>
-        </a:xfrm>
-      </p:grpSpPr>
-      <p:sp>
-        <p:nvSpPr>
-          <p:cNvPr id="5" name="TextBox 4">
-            <a:extLst>
-              <a:ext uri="{FF2B5EF4-FFF2-40B4-BE49-F238E27FC236}">
-                <a16:creationId xmlns:a16="http://schemas.microsoft.com/office/drawing/2014/main" id="{02AD67EE-A742-45E1-9CE5-4A7467B02DEE}"/>
-              </a:ext>
-            </a:extLst>
-          </p:cNvPr>
-          <p:cNvSpPr txBox="1"/>
-          <p:nvPr/>
-        </p:nvSpPr>
-        <p:spPr>
-          <a:xfrm>
-            <a:off x="1427337" y="1751674"/>
-            <a:ext cx="9497837" cy="2769989"/>
-          </a:xfrm>
-          <a:prstGeom prst="rect">
-            <a:avLst/>
-          </a:prstGeom>
-          <a:noFill/>
-        </p:spPr>
-        <p:txBody>
-          <a:bodyPr wrap="square">
-            <a:spAutoFit/>
-          </a:bodyPr>
-          <a:lstStyle/>
-          <a:p>
-            <a:pPr algn="l"/>
-            <a:r>
-              <a:rPr lang="en" b="1" dirty="0">
-                <a:uFill>
-                  <a:noFill/>
-                </a:uFill>
-              </a:rPr>
-              <a:t>Data Source:</a:t>
-            </a:r>
-            <a:r>
-              <a:rPr lang="en" dirty="0">
-                <a:uFill>
-                  <a:noFill/>
-                </a:uFill>
-              </a:rPr>
-              <a:t>  </a:t>
-            </a:r>
-            <a:r>
-              <a:rPr lang="en-US" sz="1800" dirty="0">
-                <a:effectLst/>
-                <a:latin typeface="Calibri" panose="020F0502020204030204" pitchFamily="34" charset="0"/>
-                <a:hlinkClick r:id="rId2"/>
-              </a:rPr>
-              <a:t>https://www.kaggle.com/sobhanmoosavi/us-weather-events</a:t>
-            </a:r>
-            <a:r>
-              <a:rPr lang="en-US" sz="1800" dirty="0">
-                <a:effectLst/>
-                <a:latin typeface="Calibri" panose="020F0502020204030204" pitchFamily="34" charset="0"/>
-              </a:rPr>
-              <a:t>  </a:t>
-            </a:r>
-            <a:r>
-              <a:rPr lang="en-US" sz="1200" b="0" i="1" dirty="0">
-                <a:solidFill>
-                  <a:srgbClr val="1D1C1D"/>
-                </a:solidFill>
-                <a:effectLst/>
-                <a:latin typeface="Slack-Lato"/>
-              </a:rPr>
-              <a:t>A nationwide dataset of 6.3 million weather events (2016 - 2020)</a:t>
-            </a:r>
-            <a:r>
-              <a:rPr lang="en-US" sz="1200" i="1" dirty="0">
-                <a:uFill>
-                  <a:noFill/>
-                </a:uFill>
-                <a:latin typeface="Calibri" panose="020F0502020204030204" pitchFamily="34" charset="0"/>
-              </a:rPr>
-              <a:t> </a:t>
-            </a:r>
-          </a:p>
-          <a:p>
-            <a:pPr algn="l"/>
-            <a:endParaRPr lang="en-US" sz="1200" b="0" i="1" dirty="0">
-              <a:solidFill>
-                <a:srgbClr val="1D1C1D"/>
-              </a:solidFill>
-              <a:effectLst/>
-              <a:uFill>
-                <a:noFill/>
-              </a:uFill>
-              <a:latin typeface="Calibri" panose="020F0502020204030204" pitchFamily="34" charset="0"/>
-            </a:endParaRPr>
-          </a:p>
-          <a:p>
-            <a:pPr algn="l"/>
-            <a:r>
-              <a:rPr lang="en-US" b="1" dirty="0">
-                <a:uFill>
-                  <a:noFill/>
-                </a:uFill>
-              </a:rPr>
-              <a:t>Citation of papers associated to dataset used</a:t>
-            </a:r>
-            <a:r>
-              <a:rPr lang="en-US" sz="1200" b="0" i="0" dirty="0">
-                <a:solidFill>
-                  <a:srgbClr val="1D1C1D"/>
-                </a:solidFill>
-                <a:effectLst/>
-                <a:latin typeface="Slack-Lato"/>
-              </a:rPr>
-              <a:t>:</a:t>
-            </a:r>
-            <a:br>
-              <a:rPr lang="en-US" sz="1200" b="0" i="0" dirty="0">
-                <a:solidFill>
-                  <a:srgbClr val="1D1C1D"/>
-                </a:solidFill>
-                <a:effectLst/>
-                <a:latin typeface="Slack-Lato"/>
-              </a:rPr>
-            </a:br>
-            <a:endParaRPr lang="en-US" sz="1200" b="0" i="0" dirty="0">
-              <a:solidFill>
-                <a:srgbClr val="1D1C1D"/>
-              </a:solidFill>
-              <a:effectLst/>
-              <a:latin typeface="Slack-Lato"/>
-            </a:endParaRPr>
-          </a:p>
-          <a:p>
-            <a:pPr marL="285750" indent="-285750">
-              <a:buFont typeface="Arial" panose="020B0604020202020204" pitchFamily="34" charset="0"/>
-              <a:buChar char="•"/>
-            </a:pPr>
-            <a:r>
-              <a:rPr lang="en-US" dirty="0" err="1">
-                <a:uFill>
-                  <a:noFill/>
-                </a:uFill>
-              </a:rPr>
-              <a:t>Moosavi</a:t>
-            </a:r>
-            <a:r>
-              <a:rPr lang="en-US" dirty="0">
-                <a:uFill>
-                  <a:noFill/>
-                </a:uFill>
-              </a:rPr>
-              <a:t>, </a:t>
-            </a:r>
-            <a:r>
-              <a:rPr lang="en-US" dirty="0" err="1">
-                <a:uFill>
-                  <a:noFill/>
-                </a:uFill>
-              </a:rPr>
-              <a:t>Sobhan</a:t>
-            </a:r>
-            <a:r>
-              <a:rPr lang="en-US" dirty="0">
-                <a:uFill>
-                  <a:noFill/>
-                </a:uFill>
-              </a:rPr>
-              <a:t>, Mohammad Hossein </a:t>
-            </a:r>
-            <a:r>
-              <a:rPr lang="en-US" dirty="0" err="1">
-                <a:uFill>
-                  <a:noFill/>
-                </a:uFill>
-              </a:rPr>
-              <a:t>Samavatian</a:t>
-            </a:r>
-            <a:r>
-              <a:rPr lang="en-US" dirty="0">
-                <a:uFill>
-                  <a:noFill/>
-                </a:uFill>
-              </a:rPr>
-              <a:t>, Arnab Nandi, Srinivasan Parthasarathy, and Rajiv Ramnath. </a:t>
-            </a:r>
-            <a:r>
-              <a:rPr lang="en-US" b="1" dirty="0">
-                <a:uFill>
-                  <a:noFill/>
-                </a:uFill>
-              </a:rPr>
-              <a:t>“</a:t>
-            </a:r>
-            <a:r>
-              <a:rPr lang="en-US" b="1" dirty="0">
-                <a:uFill>
-                  <a:noFill/>
-                </a:uFill>
-                <a:hlinkClick r:id="rId3">
-                  <a:extLst>
-                    <a:ext uri="{A12FA001-AC4F-418D-AE19-62706E023703}">
-                      <ahyp:hlinkClr xmlns:ahyp="http://schemas.microsoft.com/office/drawing/2018/hyperlinkcolor" val="tx"/>
-                    </a:ext>
-                  </a:extLst>
-                </a:hlinkClick>
-              </a:rPr>
-              <a:t>Short and Long-term Pattern Discovery Over Large-Scale Geo-Spatiotemporal Data</a:t>
-            </a:r>
-            <a:r>
-              <a:rPr lang="en-US" b="1" dirty="0">
-                <a:uFill>
-                  <a:noFill/>
-                </a:uFill>
-              </a:rPr>
-              <a:t>.” </a:t>
-            </a:r>
-            <a:r>
-              <a:rPr lang="en-US" dirty="0">
-                <a:uFill>
-                  <a:noFill/>
-                </a:uFill>
-              </a:rPr>
-              <a:t>In Proceedings of the 25th ACM SIGKDD International Conference on Knowledge Discovery &amp; Data Mining, ACM, 2019.</a:t>
-            </a:r>
-          </a:p>
-          <a:p>
-            <a:endParaRPr lang="en-US" sz="1200" i="1" dirty="0">
-              <a:uFill>
-                <a:noFill/>
-              </a:uFill>
-              <a:latin typeface="Calibri" panose="020F0502020204030204" pitchFamily="34" charset="0"/>
-            </a:endParaRPr>
-          </a:p>
-          <a:p>
-            <a:endParaRPr lang="en" sz="1800" dirty="0">
-              <a:uFill>
-                <a:noFill/>
-              </a:uFill>
-            </a:endParaRPr>
-          </a:p>
-        </p:txBody>
-      </p:sp>
-      <p:sp>
-        <p:nvSpPr>
-          <p:cNvPr id="11" name="Title 10">
-            <a:extLst>
-              <a:ext uri="{FF2B5EF4-FFF2-40B4-BE49-F238E27FC236}">
-                <a16:creationId xmlns:a16="http://schemas.microsoft.com/office/drawing/2014/main" id="{5A7ECB63-9D3C-487E-B9EE-887B5856374A}"/>
-              </a:ext>
-            </a:extLst>
-          </p:cNvPr>
-          <p:cNvSpPr>
-            <a:spLocks noGrp="1"/>
-          </p:cNvSpPr>
-          <p:nvPr>
-            <p:ph type="title"/>
-          </p:nvPr>
-        </p:nvSpPr>
-        <p:spPr>
-          <a:xfrm>
-            <a:off x="801249" y="712186"/>
-            <a:ext cx="10123925" cy="883715"/>
-          </a:xfrm>
-        </p:spPr>
-        <p:txBody>
-          <a:bodyPr>
-            <a:normAutofit fontScale="90000"/>
-          </a:bodyPr>
-          <a:lstStyle/>
-          <a:p>
-            <a:pPr algn="ctr"/>
-            <a:r>
-              <a:rPr lang="en-US" sz="4400" dirty="0"/>
-              <a:t>Resources/Back up </a:t>
-            </a:r>
-            <a:br>
-              <a:rPr lang="en-US" sz="4000" b="1" cap="none" spc="0" dirty="0">
-                <a:solidFill>
-                  <a:schemeClr val="tx1">
-                    <a:lumMod val="85000"/>
-                    <a:lumOff val="15000"/>
-                  </a:schemeClr>
-                </a:solidFill>
-                <a:ea typeface="+mn-ea"/>
-                <a:cs typeface="+mn-cs"/>
-              </a:rPr>
-            </a:br>
-            <a:endParaRPr lang="en-US" dirty="0"/>
-          </a:p>
-        </p:txBody>
-      </p:sp>
-      <p:sp>
-        <p:nvSpPr>
-          <p:cNvPr id="12" name="Date Placeholder 11">
-            <a:extLst>
-              <a:ext uri="{FF2B5EF4-FFF2-40B4-BE49-F238E27FC236}">
-                <a16:creationId xmlns:a16="http://schemas.microsoft.com/office/drawing/2014/main" id="{C7A112C6-290C-461E-9FE6-460BB2BB6A10}"/>
-              </a:ext>
-            </a:extLst>
-          </p:cNvPr>
-          <p:cNvSpPr>
-            <a:spLocks noGrp="1"/>
-          </p:cNvSpPr>
-          <p:nvPr>
-            <p:ph type="dt" sz="half" idx="10"/>
-          </p:nvPr>
-        </p:nvSpPr>
-        <p:spPr>
-          <a:xfrm>
-            <a:off x="3975100" y="5962934"/>
-            <a:ext cx="2893045" cy="365760"/>
-          </a:xfrm>
-        </p:spPr>
-        <p:txBody>
-          <a:bodyPr/>
-          <a:lstStyle/>
-          <a:p>
-            <a:r>
-              <a:rPr lang="en-US" dirty="0"/>
-              <a:t>8/16/2021</a:t>
-            </a:r>
-          </a:p>
-        </p:txBody>
-      </p:sp>
-      <p:sp>
-        <p:nvSpPr>
-          <p:cNvPr id="13" name="Footer Placeholder 12">
-            <a:extLst>
-              <a:ext uri="{FF2B5EF4-FFF2-40B4-BE49-F238E27FC236}">
-                <a16:creationId xmlns:a16="http://schemas.microsoft.com/office/drawing/2014/main" id="{10E63371-A3C6-49B2-8E70-0394847EE214}"/>
-              </a:ext>
-            </a:extLst>
-          </p:cNvPr>
-          <p:cNvSpPr>
-            <a:spLocks noGrp="1"/>
-          </p:cNvSpPr>
-          <p:nvPr>
-            <p:ph type="ftr" sz="quarter" idx="11"/>
-          </p:nvPr>
-        </p:nvSpPr>
-        <p:spPr/>
-        <p:txBody>
-          <a:bodyPr/>
-          <a:lstStyle/>
-          <a:p>
-            <a:r>
-              <a:rPr lang="en-US"/>
-              <a:t>https://github.com/Fescamil1/Project3_Group4</a:t>
-            </a:r>
-            <a:endParaRPr lang="en-US" dirty="0"/>
-          </a:p>
-        </p:txBody>
-      </p:sp>
-      <p:sp>
-        <p:nvSpPr>
-          <p:cNvPr id="14" name="Slide Number Placeholder 13">
-            <a:extLst>
-              <a:ext uri="{FF2B5EF4-FFF2-40B4-BE49-F238E27FC236}">
-                <a16:creationId xmlns:a16="http://schemas.microsoft.com/office/drawing/2014/main" id="{993B837A-10C4-434D-BF8A-5E785B0507A0}"/>
-              </a:ext>
-            </a:extLst>
-          </p:cNvPr>
-          <p:cNvSpPr>
-            <a:spLocks noGrp="1"/>
-          </p:cNvSpPr>
-          <p:nvPr>
-            <p:ph type="sldNum" sz="quarter" idx="12"/>
-          </p:nvPr>
-        </p:nvSpPr>
-        <p:spPr/>
-        <p:txBody>
-          <a:bodyPr/>
-          <a:lstStyle/>
-          <a:p>
-            <a:fld id="{34B7E4EF-A1BD-40F4-AB7B-04F084DD991D}" type="slidenum">
-              <a:rPr lang="en-US" smtClean="0"/>
-              <a:t>8</a:t>
-            </a:fld>
-            <a:endParaRPr lang="en-US" dirty="0"/>
-          </a:p>
-        </p:txBody>
-      </p:sp>
-    </p:spTree>
-    <p:extLst>
-      <p:ext uri="{BB962C8B-B14F-4D97-AF65-F5344CB8AC3E}">
-        <p14:creationId xmlns:p14="http://schemas.microsoft.com/office/powerpoint/2010/main" val="865311960"/>
-      </p:ext>
-    </p:extLst>
-  </p:cSld>
-  <p:clrMapOvr>
-    <a:masterClrMapping/>
-  </p:clrMapOvr>
-</p:sld>
-</file>
-
 <file path=ppt/slides/slide9.xml><?xml version="1.0" encoding="utf-8"?>
 <p:sld xmlns:a="http://schemas.openxmlformats.org/drawingml/2006/main" xmlns:r="http://schemas.openxmlformats.org/officeDocument/2006/relationships" xmlns:p="http://schemas.openxmlformats.org/presentationml/2006/main">
   <p:cSld>
@@ -6283,61 +6159,146 @@
       </p:grpSpPr>
       <p:sp>
         <p:nvSpPr>
-          <p:cNvPr id="2" name="Title 1">
+          <p:cNvPr id="5" name="TextBox 4">
             <a:extLst>
               <a:ext uri="{FF2B5EF4-FFF2-40B4-BE49-F238E27FC236}">
-                <a16:creationId xmlns:a16="http://schemas.microsoft.com/office/drawing/2014/main" id="{AB091C5E-153A-4753-AF88-469D4DC67C7F}"/>
+                <a16:creationId xmlns:a16="http://schemas.microsoft.com/office/drawing/2014/main" id="{02AD67EE-A742-45E1-9CE5-4A7467B02DEE}"/>
               </a:ext>
             </a:extLst>
           </p:cNvPr>
-          <p:cNvSpPr>
-            <a:spLocks noGrp="1"/>
-          </p:cNvSpPr>
-          <p:nvPr>
-            <p:ph type="title"/>
-          </p:nvPr>
-        </p:nvSpPr>
-        <p:spPr/>
-        <p:txBody>
-          <a:bodyPr/>
+          <p:cNvSpPr txBox="1"/>
+          <p:nvPr/>
+        </p:nvSpPr>
+        <p:spPr>
+          <a:xfrm>
+            <a:off x="1427337" y="1751674"/>
+            <a:ext cx="9497837" cy="2769989"/>
+          </a:xfrm>
+          <a:prstGeom prst="rect">
+            <a:avLst/>
+          </a:prstGeom>
+          <a:noFill/>
+        </p:spPr>
+        <p:txBody>
+          <a:bodyPr wrap="square">
+            <a:spAutoFit/>
+          </a:bodyPr>
           <a:lstStyle/>
           <a:p>
-            <a:pPr algn="ctr"/>
-            <a:r>
-              <a:rPr lang="en-US" dirty="0"/>
-              <a:t>Project Scope and Details</a:t>
-            </a:r>
-          </a:p>
-        </p:txBody>
-      </p:sp>
-      <p:sp>
-        <p:nvSpPr>
-          <p:cNvPr id="3" name="Content Placeholder 2">
-            <a:extLst>
-              <a:ext uri="{FF2B5EF4-FFF2-40B4-BE49-F238E27FC236}">
-                <a16:creationId xmlns:a16="http://schemas.microsoft.com/office/drawing/2014/main" id="{E28AF885-36A7-4E04-8763-219D2C1E0EDC}"/>
-              </a:ext>
-            </a:extLst>
-          </p:cNvPr>
-          <p:cNvSpPr>
-            <a:spLocks noGrp="1"/>
-          </p:cNvSpPr>
-          <p:nvPr>
-            <p:ph idx="1"/>
-          </p:nvPr>
-        </p:nvSpPr>
-        <p:spPr/>
-        <p:txBody>
-          <a:bodyPr/>
-          <a:lstStyle/>
-          <a:p>
+            <a:pPr algn="l"/>
+            <a:r>
+              <a:rPr lang="en" b="1" dirty="0">
+                <a:uFill>
+                  <a:noFill/>
+                </a:uFill>
+              </a:rPr>
+              <a:t>Data Source:</a:t>
+            </a:r>
+            <a:r>
+              <a:rPr lang="en" dirty="0">
+                <a:uFill>
+                  <a:noFill/>
+                </a:uFill>
+              </a:rPr>
+              <a:t>  </a:t>
+            </a:r>
+            <a:r>
+              <a:rPr lang="en-US" sz="1800" dirty="0">
+                <a:effectLst/>
+                <a:latin typeface="Calibri" panose="020F0502020204030204" pitchFamily="34" charset="0"/>
+                <a:hlinkClick r:id="rId2"/>
+              </a:rPr>
+              <a:t>https://www.kaggle.com/sobhanmoosavi/us-weather-events</a:t>
+            </a:r>
+            <a:r>
+              <a:rPr lang="en-US" sz="1800" dirty="0">
+                <a:effectLst/>
+                <a:latin typeface="Calibri" panose="020F0502020204030204" pitchFamily="34" charset="0"/>
+              </a:rPr>
+              <a:t>  </a:t>
+            </a:r>
+            <a:r>
+              <a:rPr lang="en-US" sz="1200" b="0" i="1" dirty="0">
+                <a:solidFill>
+                  <a:srgbClr val="1D1C1D"/>
+                </a:solidFill>
+                <a:effectLst/>
+                <a:latin typeface="Slack-Lato"/>
+              </a:rPr>
+              <a:t>A nationwide dataset of 6.3 million weather events (2016 - 2020)</a:t>
+            </a:r>
+            <a:r>
+              <a:rPr lang="en-US" sz="1200" i="1" dirty="0">
+                <a:uFill>
+                  <a:noFill/>
+                </a:uFill>
+                <a:latin typeface="Calibri" panose="020F0502020204030204" pitchFamily="34" charset="0"/>
+              </a:rPr>
+              <a:t> </a:t>
+            </a:r>
+          </a:p>
+          <a:p>
+            <a:pPr algn="l"/>
+            <a:endParaRPr lang="en-US" sz="1200" b="0" i="1" dirty="0">
+              <a:solidFill>
+                <a:srgbClr val="1D1C1D"/>
+              </a:solidFill>
+              <a:effectLst/>
+              <a:uFill>
+                <a:noFill/>
+              </a:uFill>
+              <a:latin typeface="Calibri" panose="020F0502020204030204" pitchFamily="34" charset="0"/>
+            </a:endParaRPr>
+          </a:p>
+          <a:p>
+            <a:pPr algn="l"/>
             <a:r>
               <a:rPr lang="en-US" b="1" dirty="0">
                 <a:uFill>
                   <a:noFill/>
                 </a:uFill>
               </a:rPr>
-              <a:t>Project Focus: </a:t>
+              <a:t>Citation of papers associated to dataset used</a:t>
+            </a:r>
+            <a:r>
+              <a:rPr lang="en-US" sz="1200" b="0" i="0" dirty="0">
+                <a:solidFill>
+                  <a:srgbClr val="1D1C1D"/>
+                </a:solidFill>
+                <a:effectLst/>
+                <a:latin typeface="Slack-Lato"/>
+              </a:rPr>
+              <a:t>:</a:t>
+            </a:r>
+            <a:br>
+              <a:rPr lang="en-US" sz="1200" b="0" i="0" dirty="0">
+                <a:solidFill>
+                  <a:srgbClr val="1D1C1D"/>
+                </a:solidFill>
+                <a:effectLst/>
+                <a:latin typeface="Slack-Lato"/>
+              </a:rPr>
+            </a:br>
+            <a:endParaRPr lang="en-US" sz="1200" b="0" i="0" dirty="0">
+              <a:solidFill>
+                <a:srgbClr val="1D1C1D"/>
+              </a:solidFill>
+              <a:effectLst/>
+              <a:latin typeface="Slack-Lato"/>
+            </a:endParaRPr>
+          </a:p>
+          <a:p>
+            <a:pPr marL="285750" indent="-285750">
+              <a:buFont typeface="Arial" panose="020B0604020202020204" pitchFamily="34" charset="0"/>
+              <a:buChar char="•"/>
+            </a:pPr>
+            <a:r>
+              <a:rPr lang="en-US" dirty="0" err="1">
+                <a:uFill>
+                  <a:noFill/>
+                </a:uFill>
+              </a:rPr>
+              <a:t>Moosavi</a:t>
             </a:r>
             <a:r>
               <a:rPr lang="en-US" dirty="0">
@@ -6345,24 +6306,70 @@
                   <a:noFill/>
                 </a:uFill>
               </a:rPr>
-              <a:t>top 10 most populated cities in the US - Austin, Chicago, Dallas, Houston, Los Angeles, New York, Philadelphia, Phoenix, San Antonio, San Diego </a:t>
-            </a:r>
-          </a:p>
-          <a:p>
-            <a:endParaRPr lang="en-US" dirty="0">
-              <a:uFill>
-                <a:noFill/>
-              </a:uFill>
-            </a:endParaRPr>
-          </a:p>
-          <a:p>
+              <a:t>, </a:t>
+            </a:r>
+            <a:r>
+              <a:rPr lang="en-US" dirty="0" err="1">
+                <a:uFill>
+                  <a:noFill/>
+                </a:uFill>
+              </a:rPr>
+              <a:t>Sobhan</a:t>
+            </a:r>
+            <a:r>
+              <a:rPr lang="en-US" dirty="0">
+                <a:uFill>
+                  <a:noFill/>
+                </a:uFill>
+              </a:rPr>
+              <a:t>, Mohammad Hossein </a:t>
+            </a:r>
+            <a:r>
+              <a:rPr lang="en-US" dirty="0" err="1">
+                <a:uFill>
+                  <a:noFill/>
+                </a:uFill>
+              </a:rPr>
+              <a:t>Samavatian</a:t>
+            </a:r>
+            <a:r>
+              <a:rPr lang="en-US" dirty="0">
+                <a:uFill>
+                  <a:noFill/>
+                </a:uFill>
+              </a:rPr>
+              <a:t>, Arnab Nandi, Srinivasan Parthasarathy, and Rajiv Ramnath. </a:t>
+            </a:r>
             <a:r>
               <a:rPr lang="en-US" b="1" dirty="0">
                 <a:uFill>
                   <a:noFill/>
                 </a:uFill>
               </a:rPr>
-              <a:t>Data cleaning:  </a:t>
+              <a:t>“</a:t>
+            </a:r>
+            <a:r>
+              <a:rPr lang="en-US" b="1" dirty="0">
+                <a:uFill>
+                  <a:noFill/>
+                </a:uFill>
+                <a:hlinkClick r:id="rId3">
+                  <a:extLst>
+                    <a:ext uri="{A12FA001-AC4F-418D-AE19-62706E023703}">
+                      <ahyp:hlinkClr xmlns:ahyp="http://schemas.microsoft.com/office/drawing/2018/hyperlinkcolor" val="tx"/>
+                    </a:ext>
+                  </a:extLst>
+                </a:hlinkClick>
+              </a:rPr>
+              <a:t>Short and Long-term Pattern Discovery Over Large-Scale Geo-Spatiotemporal Data</a:t>
+            </a:r>
+            <a:r>
+              <a:rPr lang="en-US" b="1" dirty="0">
+                <a:uFill>
+                  <a:noFill/>
+                </a:uFill>
+              </a:rPr>
+              <a:t>.” </a:t>
             </a:r>
             <a:r>
               <a:rPr lang="en-US" dirty="0">
@@ -6370,72 +6377,11 @@
                   <a:noFill/>
                 </a:uFill>
               </a:rPr>
-              <a:t>Original data file of 6.3M records was filtered to a manageable data record file of 54k:  Data filtering by major US city, and group summarizations by: Year, City, Weather Type, and Average percent per year calculations. </a:t>
-            </a:r>
-            <a:endParaRPr lang="en-US" sz="1100" dirty="0">
-              <a:solidFill>
-                <a:srgbClr val="000000"/>
-              </a:solidFill>
-              <a:latin typeface="Inter"/>
-            </a:endParaRPr>
-          </a:p>
-          <a:p>
-            <a:endParaRPr lang="en-US" b="1" dirty="0">
-              <a:uFill>
-                <a:noFill/>
-              </a:uFill>
-            </a:endParaRPr>
-          </a:p>
-          <a:p>
-            <a:r>
-              <a:rPr lang="en-US" b="1" dirty="0">
-                <a:uFill>
-                  <a:noFill/>
-                </a:uFill>
-              </a:rPr>
-              <a:t>Questions asked by the Team:  </a:t>
-            </a:r>
-            <a:r>
-              <a:rPr lang="en-US" dirty="0">
-                <a:uFill>
-                  <a:noFill/>
-                </a:uFill>
-              </a:rPr>
-              <a:t>Major US city climates impacted the least or greatest by rain, snow, cold, hail, fog, precipitation?  </a:t>
-            </a:r>
-            <a:endParaRPr lang="en-US" b="1" dirty="0">
-              <a:uFill>
-                <a:noFill/>
-              </a:uFill>
-            </a:endParaRPr>
-          </a:p>
-          <a:p>
-            <a:endParaRPr lang="en-US" b="1" dirty="0">
-              <a:uFill>
-                <a:noFill/>
-              </a:uFill>
-            </a:endParaRPr>
-          </a:p>
-          <a:p>
-            <a:r>
-              <a:rPr lang="en-US" b="1" dirty="0">
-                <a:uFill>
-                  <a:noFill/>
-                </a:uFill>
-              </a:rPr>
-              <a:t>The following were noted as deviations </a:t>
-            </a:r>
-            <a:r>
-              <a:rPr lang="en-US" b="1" u="sng" dirty="0">
-                <a:uFill>
-                  <a:noFill/>
-                </a:uFill>
-              </a:rPr>
-              <a:t>from what would normally be expected:  </a:t>
-            </a:r>
-          </a:p>
-          <a:p>
-            <a:endParaRPr lang="en-US" b="1" i="1" u="sng" dirty="0">
+              <a:t>In Proceedings of the 25th ACM SIGKDD International Conference on Knowledge Discovery &amp; Data Mining, ACM, 2019.</a:t>
+            </a:r>
+          </a:p>
+          <a:p>
+            <a:endParaRPr lang="en-US" sz="1200" i="1" dirty="0">
               <a:uFill>
                 <a:noFill/>
               </a:uFill>
@@ -6443,6 +6389,150 @@
             </a:endParaRPr>
           </a:p>
           <a:p>
+            <a:endParaRPr lang="en" sz="1800" dirty="0">
+              <a:uFill>
+                <a:noFill/>
+              </a:uFill>
+            </a:endParaRPr>
+          </a:p>
+        </p:txBody>
+      </p:sp>
+      <p:sp>
+        <p:nvSpPr>
+          <p:cNvPr id="11" name="Title 10">
+            <a:extLst>
+              <a:ext uri="{FF2B5EF4-FFF2-40B4-BE49-F238E27FC236}">
+                <a16:creationId xmlns:a16="http://schemas.microsoft.com/office/drawing/2014/main" id="{5A7ECB63-9D3C-487E-B9EE-887B5856374A}"/>
+              </a:ext>
+            </a:extLst>
+          </p:cNvPr>
+          <p:cNvSpPr>
+            <a:spLocks noGrp="1"/>
+          </p:cNvSpPr>
+          <p:nvPr>
+            <p:ph type="title"/>
+          </p:nvPr>
+        </p:nvSpPr>
+        <p:spPr>
+          <a:xfrm>
+            <a:off x="801249" y="712186"/>
+            <a:ext cx="10123925" cy="883715"/>
+          </a:xfrm>
+        </p:spPr>
+        <p:txBody>
+          <a:bodyPr>
+            <a:normAutofit fontScale="90000"/>
+          </a:bodyPr>
+          <a:lstStyle/>
+          <a:p>
+            <a:pPr algn="ctr"/>
+            <a:r>
+              <a:rPr lang="en-US" sz="4400" dirty="0"/>
+              <a:t>Resources/Back up </a:t>
+            </a:r>
+            <a:br>
+              <a:rPr lang="en-US" sz="4000" b="1" cap="none" spc="0" dirty="0">
+                <a:solidFill>
+                  <a:schemeClr val="tx1">
+                    <a:lumMod val="85000"/>
+                    <a:lumOff val="15000"/>
+                  </a:schemeClr>
+                </a:solidFill>
+                <a:ea typeface="+mn-ea"/>
+                <a:cs typeface="+mn-cs"/>
+              </a:rPr>
+            </a:br>
+            <a:endParaRPr lang="en-US" dirty="0"/>
+          </a:p>
+        </p:txBody>
+      </p:sp>
+      <p:sp>
+        <p:nvSpPr>
+          <p:cNvPr id="12" name="Date Placeholder 11">
+            <a:extLst>
+              <a:ext uri="{FF2B5EF4-FFF2-40B4-BE49-F238E27FC236}">
+                <a16:creationId xmlns:a16="http://schemas.microsoft.com/office/drawing/2014/main" id="{C7A112C6-290C-461E-9FE6-460BB2BB6A10}"/>
+              </a:ext>
+            </a:extLst>
+          </p:cNvPr>
+          <p:cNvSpPr>
+            <a:spLocks noGrp="1"/>
+          </p:cNvSpPr>
+          <p:nvPr>
+            <p:ph type="dt" sz="half" idx="10"/>
+          </p:nvPr>
+        </p:nvSpPr>
+        <p:spPr>
+          <a:xfrm>
+            <a:off x="3975100" y="5962934"/>
+            <a:ext cx="2893045" cy="365760"/>
+          </a:xfrm>
+        </p:spPr>
+        <p:txBody>
+          <a:bodyPr/>
+          <a:lstStyle/>
+          <a:p>
+            <a:r>
+              <a:rPr lang="en-US" dirty="0"/>
+              <a:t>8/16/2021</a:t>
+            </a:r>
+          </a:p>
+        </p:txBody>
+      </p:sp>
+      <p:sp>
+        <p:nvSpPr>
+          <p:cNvPr id="13" name="Footer Placeholder 12">
+            <a:extLst>
+              <a:ext uri="{FF2B5EF4-FFF2-40B4-BE49-F238E27FC236}">
+                <a16:creationId xmlns:a16="http://schemas.microsoft.com/office/drawing/2014/main" id="{10E63371-A3C6-49B2-8E70-0394847EE214}"/>
+              </a:ext>
+            </a:extLst>
+          </p:cNvPr>
+          <p:cNvSpPr>
+            <a:spLocks noGrp="1"/>
+          </p:cNvSpPr>
+          <p:nvPr>
+            <p:ph type="ftr" sz="quarter" idx="11"/>
+          </p:nvPr>
+        </p:nvSpPr>
+        <p:spPr/>
+        <p:txBody>
+          <a:bodyPr/>
+          <a:lstStyle/>
+          <a:p>
+            <a:r>
+              <a:rPr lang="en-US"/>
+              <a:t>https://github.com/Fescamil1/Project3_Group4</a:t>
+            </a:r>
+            <a:endParaRPr lang="en-US" dirty="0"/>
+          </a:p>
+        </p:txBody>
+      </p:sp>
+      <p:sp>
+        <p:nvSpPr>
+          <p:cNvPr id="14" name="Slide Number Placeholder 13">
+            <a:extLst>
+              <a:ext uri="{FF2B5EF4-FFF2-40B4-BE49-F238E27FC236}">
+                <a16:creationId xmlns:a16="http://schemas.microsoft.com/office/drawing/2014/main" id="{993B837A-10C4-434D-BF8A-5E785B0507A0}"/>
+              </a:ext>
+            </a:extLst>
+          </p:cNvPr>
+          <p:cNvSpPr>
+            <a:spLocks noGrp="1"/>
+          </p:cNvSpPr>
+          <p:nvPr>
+            <p:ph type="sldNum" sz="quarter" idx="12"/>
+          </p:nvPr>
+        </p:nvSpPr>
+        <p:spPr/>
+        <p:txBody>
+          <a:bodyPr/>
+          <a:lstStyle/>
+          <a:p>
+            <a:fld id="{34B7E4EF-A1BD-40F4-AB7B-04F084DD991D}" type="slidenum">
+              <a:rPr lang="en-US" smtClean="0"/>
+              <a:t>9</a:t>
+            </a:fld>
             <a:endParaRPr lang="en-US" dirty="0"/>
           </a:p>
         </p:txBody>
@@ -6450,7 +6540,7 @@
     </p:spTree>
     <p:extLst>
       <p:ext uri="{BB962C8B-B14F-4D97-AF65-F5344CB8AC3E}">
-        <p14:creationId xmlns:p14="http://schemas.microsoft.com/office/powerpoint/2010/main" val="4102569808"/>
+        <p14:creationId xmlns:p14="http://schemas.microsoft.com/office/powerpoint/2010/main" val="865311960"/>
       </p:ext>
     </p:extLst>
   </p:cSld>
@@ -6737,6 +6827,24 @@
 </file>
 
 <file path=customXml/item1.xml><?xml version="1.0" encoding="utf-8"?>
+<p:properties xmlns:p="http://schemas.microsoft.com/office/2006/metadata/properties" xmlns:xsi="http://www.w3.org/2001/XMLSchema-instance" xmlns:pc="http://schemas.microsoft.com/office/infopath/2007/PartnerControls">
+  <documentManagement>
+    <Status xmlns="71af3243-3dd4-4a8d-8c0d-dd76da1f02a5">Not started</Status>
+    <MediaServiceKeyPoints xmlns="71af3243-3dd4-4a8d-8c0d-dd76da1f02a5" xsi:nil="true"/>
+  </documentManagement>
+</p:properties>
+</file>
+
+<file path=customXml/item2.xml><?xml version="1.0" encoding="utf-8"?>
+<?mso-contentType ?>
+<FormTemplates xmlns="http://schemas.microsoft.com/sharepoint/v3/contenttype/forms">
+  <Display>DocumentLibraryForm</Display>
+  <Edit>DocumentLibraryForm</Edit>
+  <New>DocumentLibraryForm</New>
+</FormTemplates>
+</file>
+
+<file path=customXml/item3.xml><?xml version="1.0" encoding="utf-8"?>
 <ct:contentTypeSchema xmlns:ct="http://schemas.microsoft.com/office/2006/metadata/contentType" xmlns:ma="http://schemas.microsoft.com/office/2006/metadata/properties/metaAttributes" ct:_="" ma:_="" ma:contentTypeName="Document" ma:contentTypeID="0x01010079F111ED35F8CC479449609E8A0923A6" ma:contentTypeVersion="12" ma:contentTypeDescription="Create a new document." ma:contentTypeScope="" ma:versionID="a410dd7f93c95333ffa1b60ed6adedd1">
   <xsd:schema xmlns:xsd="http://www.w3.org/2001/XMLSchema" xmlns:xs="http://www.w3.org/2001/XMLSchema" xmlns:p="http://schemas.microsoft.com/office/2006/metadata/properties" xmlns:ns2="71af3243-3dd4-4a8d-8c0d-dd76da1f02a5" xmlns:ns3="16c05727-aa75-4e4a-9b5f-8a80a1165891" targetNamespace="http://schemas.microsoft.com/office/2006/metadata/properties" ma:root="true" ma:fieldsID="a936d9baba76aa3866493feff160faab" ns2:_="" ns3:_="">
     <xsd:import namespace="71af3243-3dd4-4a8d-8c0d-dd76da1f02a5"/>
@@ -6957,25 +7065,25 @@
 </ct:contentTypeSchema>
 </file>
 
-<file path=customXml/item2.xml><?xml version="1.0" encoding="utf-8"?>
-<?mso-contentType ?>
-<FormTemplates xmlns="http://schemas.microsoft.com/sharepoint/v3/contenttype/forms">
-  <Display>DocumentLibraryForm</Display>
-  <Edit>DocumentLibraryForm</Edit>
-  <New>DocumentLibraryForm</New>
-</FormTemplates>
+<file path=customXml/itemProps1.xml><?xml version="1.0" encoding="utf-8"?>
+<ds:datastoreItem xmlns:ds="http://schemas.openxmlformats.org/officeDocument/2006/customXml" ds:itemID="{137651BA-F45C-4845-9AB3-E0A65B39F5E1}">
+  <ds:schemaRefs>
+    <ds:schemaRef ds:uri="http://schemas.microsoft.com/office/2006/metadata/properties"/>
+    <ds:schemaRef ds:uri="http://schemas.microsoft.com/office/infopath/2007/PartnerControls"/>
+    <ds:schemaRef ds:uri="71af3243-3dd4-4a8d-8c0d-dd76da1f02a5"/>
+  </ds:schemaRefs>
+</ds:datastoreItem>
 </file>
 
-<file path=customXml/item3.xml><?xml version="1.0" encoding="utf-8"?>
-<p:properties xmlns:p="http://schemas.microsoft.com/office/2006/metadata/properties" xmlns:xsi="http://www.w3.org/2001/XMLSchema-instance" xmlns:pc="http://schemas.microsoft.com/office/infopath/2007/PartnerControls">
-  <documentManagement>
-    <Status xmlns="71af3243-3dd4-4a8d-8c0d-dd76da1f02a5">Not started</Status>
-    <MediaServiceKeyPoints xmlns="71af3243-3dd4-4a8d-8c0d-dd76da1f02a5" xsi:nil="true"/>
-  </documentManagement>
-</p:properties>
+<file path=customXml/itemProps2.xml><?xml version="1.0" encoding="utf-8"?>
+<ds:datastoreItem xmlns:ds="http://schemas.openxmlformats.org/officeDocument/2006/customXml" ds:itemID="{CDB58277-F8DF-46FF-84EC-EF41B835E69F}">
+  <ds:schemaRefs>
+    <ds:schemaRef ds:uri="http://schemas.microsoft.com/sharepoint/v3/contenttype/forms"/>
+  </ds:schemaRefs>
+</ds:datastoreItem>
 </file>
 
-<file path=customXml/itemProps1.xml><?xml version="1.0" encoding="utf-8"?>
+<file path=customXml/itemProps3.xml><?xml version="1.0" encoding="utf-8"?>
 <ds:datastoreItem xmlns:ds="http://schemas.openxmlformats.org/officeDocument/2006/customXml" ds:itemID="{2D276E62-80A3-44DD-9BCC-97ED2B99B57F}">
   <ds:schemaRefs>
     <ds:schemaRef ds:uri="http://schemas.microsoft.com/office/2006/metadata/contentType"/>
@@ -6992,22 +7100,4 @@
     <ds:schemaRef ds:uri="http://schemas.microsoft.com/internal/obd"/>
   </ds:schemaRefs>
 </ds:datastoreItem>
-</file>
-
-<file path=customXml/itemProps2.xml><?xml version="1.0" encoding="utf-8"?>
-<ds:datastoreItem xmlns:ds="http://schemas.openxmlformats.org/officeDocument/2006/customXml" ds:itemID="{CDB58277-F8DF-46FF-84EC-EF41B835E69F}">
-  <ds:schemaRefs>
-    <ds:schemaRef ds:uri="http://schemas.microsoft.com/sharepoint/v3/contenttype/forms"/>
-  </ds:schemaRefs>
-</ds:datastoreItem>
-</file>
-
-<file path=customXml/itemProps3.xml><?xml version="1.0" encoding="utf-8"?>
-<ds:datastoreItem xmlns:ds="http://schemas.openxmlformats.org/officeDocument/2006/customXml" ds:itemID="{137651BA-F45C-4845-9AB3-E0A65B39F5E1}">
-  <ds:schemaRefs>
-    <ds:schemaRef ds:uri="http://schemas.microsoft.com/office/2006/metadata/properties"/>
-    <ds:schemaRef ds:uri="http://schemas.microsoft.com/office/infopath/2007/PartnerControls"/>
-    <ds:schemaRef ds:uri="71af3243-3dd4-4a8d-8c0d-dd76da1f02a5"/>
-  </ds:schemaRefs>
-</ds:datastoreItem>
 </file>
</xml_diff>